<commit_message>
15-10-2024 - Weekly Update PostDoc presentations
</commit_message>
<xml_diff>
--- a/Website pic standardization.pptx
+++ b/Website pic standardization.pptx
@@ -8,7 +8,6 @@
     <p:sldId id="256" r:id="rId2"/>
     <p:sldId id="263" r:id="rId3"/>
     <p:sldId id="258" r:id="rId4"/>
-    <p:sldId id="264" r:id="rId5"/>
   </p:sldIdLst>
   <p:sldSz cx="12192000" cy="6858000"/>
   <p:notesSz cx="6858000" cy="9144000"/>
@@ -275,7 +274,7 @@
           <a:p>
             <a:fld id="{AED78EE6-7C35-42AA-BCAB-EACF262A9D8B}" type="datetimeFigureOut">
               <a:rPr lang="nl-NL" smtClean="0"/>
-              <a:t>1-10-2024</a:t>
+              <a:t>15-10-2024</a:t>
             </a:fld>
             <a:endParaRPr lang="nl-NL"/>
           </a:p>
@@ -475,7 +474,7 @@
           <a:p>
             <a:fld id="{AED78EE6-7C35-42AA-BCAB-EACF262A9D8B}" type="datetimeFigureOut">
               <a:rPr lang="nl-NL" smtClean="0"/>
-              <a:t>1-10-2024</a:t>
+              <a:t>15-10-2024</a:t>
             </a:fld>
             <a:endParaRPr lang="nl-NL"/>
           </a:p>
@@ -685,7 +684,7 @@
           <a:p>
             <a:fld id="{AED78EE6-7C35-42AA-BCAB-EACF262A9D8B}" type="datetimeFigureOut">
               <a:rPr lang="nl-NL" smtClean="0"/>
-              <a:t>1-10-2024</a:t>
+              <a:t>15-10-2024</a:t>
             </a:fld>
             <a:endParaRPr lang="nl-NL"/>
           </a:p>
@@ -885,7 +884,7 @@
           <a:p>
             <a:fld id="{AED78EE6-7C35-42AA-BCAB-EACF262A9D8B}" type="datetimeFigureOut">
               <a:rPr lang="nl-NL" smtClean="0"/>
-              <a:t>1-10-2024</a:t>
+              <a:t>15-10-2024</a:t>
             </a:fld>
             <a:endParaRPr lang="nl-NL"/>
           </a:p>
@@ -1161,7 +1160,7 @@
           <a:p>
             <a:fld id="{AED78EE6-7C35-42AA-BCAB-EACF262A9D8B}" type="datetimeFigureOut">
               <a:rPr lang="nl-NL" smtClean="0"/>
-              <a:t>1-10-2024</a:t>
+              <a:t>15-10-2024</a:t>
             </a:fld>
             <a:endParaRPr lang="nl-NL"/>
           </a:p>
@@ -1429,7 +1428,7 @@
           <a:p>
             <a:fld id="{AED78EE6-7C35-42AA-BCAB-EACF262A9D8B}" type="datetimeFigureOut">
               <a:rPr lang="nl-NL" smtClean="0"/>
-              <a:t>1-10-2024</a:t>
+              <a:t>15-10-2024</a:t>
             </a:fld>
             <a:endParaRPr lang="nl-NL"/>
           </a:p>
@@ -1844,7 +1843,7 @@
           <a:p>
             <a:fld id="{AED78EE6-7C35-42AA-BCAB-EACF262A9D8B}" type="datetimeFigureOut">
               <a:rPr lang="nl-NL" smtClean="0"/>
-              <a:t>1-10-2024</a:t>
+              <a:t>15-10-2024</a:t>
             </a:fld>
             <a:endParaRPr lang="nl-NL"/>
           </a:p>
@@ -1986,7 +1985,7 @@
           <a:p>
             <a:fld id="{AED78EE6-7C35-42AA-BCAB-EACF262A9D8B}" type="datetimeFigureOut">
               <a:rPr lang="nl-NL" smtClean="0"/>
-              <a:t>1-10-2024</a:t>
+              <a:t>15-10-2024</a:t>
             </a:fld>
             <a:endParaRPr lang="nl-NL"/>
           </a:p>
@@ -2099,7 +2098,7 @@
           <a:p>
             <a:fld id="{AED78EE6-7C35-42AA-BCAB-EACF262A9D8B}" type="datetimeFigureOut">
               <a:rPr lang="nl-NL" smtClean="0"/>
-              <a:t>1-10-2024</a:t>
+              <a:t>15-10-2024</a:t>
             </a:fld>
             <a:endParaRPr lang="nl-NL"/>
           </a:p>
@@ -2412,7 +2411,7 @@
           <a:p>
             <a:fld id="{AED78EE6-7C35-42AA-BCAB-EACF262A9D8B}" type="datetimeFigureOut">
               <a:rPr lang="nl-NL" smtClean="0"/>
-              <a:t>1-10-2024</a:t>
+              <a:t>15-10-2024</a:t>
             </a:fld>
             <a:endParaRPr lang="nl-NL"/>
           </a:p>
@@ -2701,7 +2700,7 @@
           <a:p>
             <a:fld id="{AED78EE6-7C35-42AA-BCAB-EACF262A9D8B}" type="datetimeFigureOut">
               <a:rPr lang="nl-NL" smtClean="0"/>
-              <a:t>1-10-2024</a:t>
+              <a:t>15-10-2024</a:t>
             </a:fld>
             <a:endParaRPr lang="nl-NL"/>
           </a:p>
@@ -2944,7 +2943,7 @@
           <a:p>
             <a:fld id="{AED78EE6-7C35-42AA-BCAB-EACF262A9D8B}" type="datetimeFigureOut">
               <a:rPr lang="nl-NL" smtClean="0"/>
-              <a:t>1-10-2024</a:t>
+              <a:t>15-10-2024</a:t>
             </a:fld>
             <a:endParaRPr lang="nl-NL"/>
           </a:p>
@@ -4073,139 +4072,6 @@
 </p:sld>
 </file>
 
-<file path=ppt/slides/slide4.xml><?xml version="1.0" encoding="utf-8"?>
-<p:sld xmlns:a="http://schemas.openxmlformats.org/drawingml/2006/main" xmlns:r="http://schemas.openxmlformats.org/officeDocument/2006/relationships" xmlns:p="http://schemas.openxmlformats.org/presentationml/2006/main">
-  <p:cSld>
-    <p:spTree>
-      <p:nvGrpSpPr>
-        <p:cNvPr id="1" name=""/>
-        <p:cNvGrpSpPr/>
-        <p:nvPr/>
-      </p:nvGrpSpPr>
-      <p:grpSpPr>
-        <a:xfrm>
-          <a:off x="0" y="0"/>
-          <a:ext cx="0" cy="0"/>
-          <a:chOff x="0" y="0"/>
-          <a:chExt cx="0" cy="0"/>
-        </a:xfrm>
-      </p:grpSpPr>
-      <p:grpSp>
-        <p:nvGrpSpPr>
-          <p:cNvPr id="5" name="Gruppo 4">
-            <a:extLst>
-              <a:ext uri="{FF2B5EF4-FFF2-40B4-BE49-F238E27FC236}">
-                <a16:creationId xmlns:a16="http://schemas.microsoft.com/office/drawing/2014/main" id="{53597294-B3E2-D56A-FD47-B37AAD984414}"/>
-              </a:ext>
-            </a:extLst>
-          </p:cNvPr>
-          <p:cNvGrpSpPr/>
-          <p:nvPr/>
-        </p:nvGrpSpPr>
-        <p:grpSpPr>
-          <a:xfrm>
-            <a:off x="3183600" y="1629000"/>
-            <a:ext cx="5824800" cy="3600000"/>
-            <a:chOff x="3183600" y="1629000"/>
-            <a:chExt cx="5824800" cy="3600000"/>
-          </a:xfrm>
-        </p:grpSpPr>
-        <p:sp>
-          <p:nvSpPr>
-            <p:cNvPr id="4" name="Rettangolo 3">
-              <a:extLst>
-                <a:ext uri="{FF2B5EF4-FFF2-40B4-BE49-F238E27FC236}">
-                  <a16:creationId xmlns:a16="http://schemas.microsoft.com/office/drawing/2014/main" id="{A4B43D83-03A1-8289-E760-4AF948E0C4F9}"/>
-                </a:ext>
-              </a:extLst>
-            </p:cNvPr>
-            <p:cNvSpPr/>
-            <p:nvPr/>
-          </p:nvSpPr>
-          <p:spPr>
-            <a:xfrm>
-              <a:off x="3183600" y="1629000"/>
-              <a:ext cx="5824800" cy="3600000"/>
-            </a:xfrm>
-            <a:prstGeom prst="rect">
-              <a:avLst/>
-            </a:prstGeom>
-            <a:solidFill>
-              <a:schemeClr val="bg1"/>
-            </a:solidFill>
-            <a:ln>
-              <a:noFill/>
-            </a:ln>
-          </p:spPr>
-          <p:style>
-            <a:lnRef idx="2">
-              <a:schemeClr val="accent1">
-                <a:shade val="15000"/>
-              </a:schemeClr>
-            </a:lnRef>
-            <a:fillRef idx="1">
-              <a:schemeClr val="accent1"/>
-            </a:fillRef>
-            <a:effectRef idx="0">
-              <a:schemeClr val="accent1"/>
-            </a:effectRef>
-            <a:fontRef idx="minor">
-              <a:schemeClr val="lt1"/>
-            </a:fontRef>
-          </p:style>
-          <p:txBody>
-            <a:bodyPr rtlCol="0" anchor="ctr"/>
-            <a:lstStyle/>
-            <a:p>
-              <a:pPr algn="ctr"/>
-              <a:endParaRPr lang="nl-NL" dirty="0"/>
-            </a:p>
-          </p:txBody>
-        </p:sp>
-        <p:pic>
-          <p:nvPicPr>
-            <p:cNvPr id="3" name="Immagine 2" descr="Immagine che contiene Arte bambini, disegno, schizzo, arte&#10;&#10;Descrizione generata automaticamente">
-              <a:extLst>
-                <a:ext uri="{FF2B5EF4-FFF2-40B4-BE49-F238E27FC236}">
-                  <a16:creationId xmlns:a16="http://schemas.microsoft.com/office/drawing/2014/main" id="{BC95D896-CA29-A164-1DB7-C940089DBEC1}"/>
-                </a:ext>
-              </a:extLst>
-            </p:cNvPr>
-            <p:cNvPicPr>
-              <a:picLocks noChangeAspect="1"/>
-            </p:cNvPicPr>
-            <p:nvPr/>
-          </p:nvPicPr>
-          <p:blipFill>
-            <a:blip r:embed="rId2"/>
-            <a:stretch>
-              <a:fillRect/>
-            </a:stretch>
-          </p:blipFill>
-          <p:spPr>
-            <a:xfrm>
-              <a:off x="3183600" y="2198280"/>
-              <a:ext cx="5824800" cy="2461440"/>
-            </a:xfrm>
-            <a:prstGeom prst="rect">
-              <a:avLst/>
-            </a:prstGeom>
-          </p:spPr>
-        </p:pic>
-      </p:grpSp>
-    </p:spTree>
-    <p:extLst>
-      <p:ext uri="{BB962C8B-B14F-4D97-AF65-F5344CB8AC3E}">
-        <p14:creationId xmlns:p14="http://schemas.microsoft.com/office/powerpoint/2010/main" val="3851482407"/>
-      </p:ext>
-    </p:extLst>
-  </p:cSld>
-  <p:clrMapOvr>
-    <a:masterClrMapping/>
-  </p:clrMapOvr>
-</p:sld>
-</file>
-
 <file path=ppt/theme/theme1.xml><?xml version="1.0" encoding="utf-8"?>
 <a:theme xmlns:a="http://schemas.openxmlformats.org/drawingml/2006/main" name="Tema di Office">
   <a:themeElements>

</xml_diff>

<commit_message>
29-10-2024 - Weekly update, descriptions and pics
</commit_message>
<xml_diff>
--- a/Website pic standardization.pptx
+++ b/Website pic standardization.pptx
@@ -274,7 +274,7 @@
           <a:p>
             <a:fld id="{AED78EE6-7C35-42AA-BCAB-EACF262A9D8B}" type="datetimeFigureOut">
               <a:rPr lang="nl-NL" smtClean="0"/>
-              <a:t>15-10-2024</a:t>
+              <a:t>30-10-2024</a:t>
             </a:fld>
             <a:endParaRPr lang="nl-NL"/>
           </a:p>
@@ -474,7 +474,7 @@
           <a:p>
             <a:fld id="{AED78EE6-7C35-42AA-BCAB-EACF262A9D8B}" type="datetimeFigureOut">
               <a:rPr lang="nl-NL" smtClean="0"/>
-              <a:t>15-10-2024</a:t>
+              <a:t>30-10-2024</a:t>
             </a:fld>
             <a:endParaRPr lang="nl-NL"/>
           </a:p>
@@ -684,7 +684,7 @@
           <a:p>
             <a:fld id="{AED78EE6-7C35-42AA-BCAB-EACF262A9D8B}" type="datetimeFigureOut">
               <a:rPr lang="nl-NL" smtClean="0"/>
-              <a:t>15-10-2024</a:t>
+              <a:t>30-10-2024</a:t>
             </a:fld>
             <a:endParaRPr lang="nl-NL"/>
           </a:p>
@@ -884,7 +884,7 @@
           <a:p>
             <a:fld id="{AED78EE6-7C35-42AA-BCAB-EACF262A9D8B}" type="datetimeFigureOut">
               <a:rPr lang="nl-NL" smtClean="0"/>
-              <a:t>15-10-2024</a:t>
+              <a:t>30-10-2024</a:t>
             </a:fld>
             <a:endParaRPr lang="nl-NL"/>
           </a:p>
@@ -1160,7 +1160,7 @@
           <a:p>
             <a:fld id="{AED78EE6-7C35-42AA-BCAB-EACF262A9D8B}" type="datetimeFigureOut">
               <a:rPr lang="nl-NL" smtClean="0"/>
-              <a:t>15-10-2024</a:t>
+              <a:t>30-10-2024</a:t>
             </a:fld>
             <a:endParaRPr lang="nl-NL"/>
           </a:p>
@@ -1428,7 +1428,7 @@
           <a:p>
             <a:fld id="{AED78EE6-7C35-42AA-BCAB-EACF262A9D8B}" type="datetimeFigureOut">
               <a:rPr lang="nl-NL" smtClean="0"/>
-              <a:t>15-10-2024</a:t>
+              <a:t>30-10-2024</a:t>
             </a:fld>
             <a:endParaRPr lang="nl-NL"/>
           </a:p>
@@ -1843,7 +1843,7 @@
           <a:p>
             <a:fld id="{AED78EE6-7C35-42AA-BCAB-EACF262A9D8B}" type="datetimeFigureOut">
               <a:rPr lang="nl-NL" smtClean="0"/>
-              <a:t>15-10-2024</a:t>
+              <a:t>30-10-2024</a:t>
             </a:fld>
             <a:endParaRPr lang="nl-NL"/>
           </a:p>
@@ -1985,7 +1985,7 @@
           <a:p>
             <a:fld id="{AED78EE6-7C35-42AA-BCAB-EACF262A9D8B}" type="datetimeFigureOut">
               <a:rPr lang="nl-NL" smtClean="0"/>
-              <a:t>15-10-2024</a:t>
+              <a:t>30-10-2024</a:t>
             </a:fld>
             <a:endParaRPr lang="nl-NL"/>
           </a:p>
@@ -2098,7 +2098,7 @@
           <a:p>
             <a:fld id="{AED78EE6-7C35-42AA-BCAB-EACF262A9D8B}" type="datetimeFigureOut">
               <a:rPr lang="nl-NL" smtClean="0"/>
-              <a:t>15-10-2024</a:t>
+              <a:t>30-10-2024</a:t>
             </a:fld>
             <a:endParaRPr lang="nl-NL"/>
           </a:p>
@@ -2411,7 +2411,7 @@
           <a:p>
             <a:fld id="{AED78EE6-7C35-42AA-BCAB-EACF262A9D8B}" type="datetimeFigureOut">
               <a:rPr lang="nl-NL" smtClean="0"/>
-              <a:t>15-10-2024</a:t>
+              <a:t>30-10-2024</a:t>
             </a:fld>
             <a:endParaRPr lang="nl-NL"/>
           </a:p>
@@ -2700,7 +2700,7 @@
           <a:p>
             <a:fld id="{AED78EE6-7C35-42AA-BCAB-EACF262A9D8B}" type="datetimeFigureOut">
               <a:rPr lang="nl-NL" smtClean="0"/>
-              <a:t>15-10-2024</a:t>
+              <a:t>30-10-2024</a:t>
             </a:fld>
             <a:endParaRPr lang="nl-NL"/>
           </a:p>
@@ -2943,7 +2943,7 @@
           <a:p>
             <a:fld id="{AED78EE6-7C35-42AA-BCAB-EACF262A9D8B}" type="datetimeFigureOut">
               <a:rPr lang="nl-NL" smtClean="0"/>
-              <a:t>15-10-2024</a:t>
+              <a:t>30-10-2024</a:t>
             </a:fld>
             <a:endParaRPr lang="nl-NL"/>
           </a:p>

</xml_diff>

<commit_message>
15-01-2025, Weekly update before colloquium
</commit_message>
<xml_diff>
--- a/Website pic standardization.pptx
+++ b/Website pic standardization.pptx
@@ -8,6 +8,7 @@
     <p:sldId id="256" r:id="rId2"/>
     <p:sldId id="263" r:id="rId3"/>
     <p:sldId id="258" r:id="rId4"/>
+    <p:sldId id="264" r:id="rId5"/>
   </p:sldIdLst>
   <p:sldSz cx="12192000" cy="6858000"/>
   <p:notesSz cx="6858000" cy="9144000"/>
@@ -274,7 +275,7 @@
           <a:p>
             <a:fld id="{AED78EE6-7C35-42AA-BCAB-EACF262A9D8B}" type="datetimeFigureOut">
               <a:rPr lang="nl-NL" smtClean="0"/>
-              <a:t>30-10-2024</a:t>
+              <a:t>15-1-2025</a:t>
             </a:fld>
             <a:endParaRPr lang="nl-NL"/>
           </a:p>
@@ -474,7 +475,7 @@
           <a:p>
             <a:fld id="{AED78EE6-7C35-42AA-BCAB-EACF262A9D8B}" type="datetimeFigureOut">
               <a:rPr lang="nl-NL" smtClean="0"/>
-              <a:t>30-10-2024</a:t>
+              <a:t>15-1-2025</a:t>
             </a:fld>
             <a:endParaRPr lang="nl-NL"/>
           </a:p>
@@ -684,7 +685,7 @@
           <a:p>
             <a:fld id="{AED78EE6-7C35-42AA-BCAB-EACF262A9D8B}" type="datetimeFigureOut">
               <a:rPr lang="nl-NL" smtClean="0"/>
-              <a:t>30-10-2024</a:t>
+              <a:t>15-1-2025</a:t>
             </a:fld>
             <a:endParaRPr lang="nl-NL"/>
           </a:p>
@@ -884,7 +885,7 @@
           <a:p>
             <a:fld id="{AED78EE6-7C35-42AA-BCAB-EACF262A9D8B}" type="datetimeFigureOut">
               <a:rPr lang="nl-NL" smtClean="0"/>
-              <a:t>30-10-2024</a:t>
+              <a:t>15-1-2025</a:t>
             </a:fld>
             <a:endParaRPr lang="nl-NL"/>
           </a:p>
@@ -1160,7 +1161,7 @@
           <a:p>
             <a:fld id="{AED78EE6-7C35-42AA-BCAB-EACF262A9D8B}" type="datetimeFigureOut">
               <a:rPr lang="nl-NL" smtClean="0"/>
-              <a:t>30-10-2024</a:t>
+              <a:t>15-1-2025</a:t>
             </a:fld>
             <a:endParaRPr lang="nl-NL"/>
           </a:p>
@@ -1428,7 +1429,7 @@
           <a:p>
             <a:fld id="{AED78EE6-7C35-42AA-BCAB-EACF262A9D8B}" type="datetimeFigureOut">
               <a:rPr lang="nl-NL" smtClean="0"/>
-              <a:t>30-10-2024</a:t>
+              <a:t>15-1-2025</a:t>
             </a:fld>
             <a:endParaRPr lang="nl-NL"/>
           </a:p>
@@ -1843,7 +1844,7 @@
           <a:p>
             <a:fld id="{AED78EE6-7C35-42AA-BCAB-EACF262A9D8B}" type="datetimeFigureOut">
               <a:rPr lang="nl-NL" smtClean="0"/>
-              <a:t>30-10-2024</a:t>
+              <a:t>15-1-2025</a:t>
             </a:fld>
             <a:endParaRPr lang="nl-NL"/>
           </a:p>
@@ -1985,7 +1986,7 @@
           <a:p>
             <a:fld id="{AED78EE6-7C35-42AA-BCAB-EACF262A9D8B}" type="datetimeFigureOut">
               <a:rPr lang="nl-NL" smtClean="0"/>
-              <a:t>30-10-2024</a:t>
+              <a:t>15-1-2025</a:t>
             </a:fld>
             <a:endParaRPr lang="nl-NL"/>
           </a:p>
@@ -2098,7 +2099,7 @@
           <a:p>
             <a:fld id="{AED78EE6-7C35-42AA-BCAB-EACF262A9D8B}" type="datetimeFigureOut">
               <a:rPr lang="nl-NL" smtClean="0"/>
-              <a:t>30-10-2024</a:t>
+              <a:t>15-1-2025</a:t>
             </a:fld>
             <a:endParaRPr lang="nl-NL"/>
           </a:p>
@@ -2411,7 +2412,7 @@
           <a:p>
             <a:fld id="{AED78EE6-7C35-42AA-BCAB-EACF262A9D8B}" type="datetimeFigureOut">
               <a:rPr lang="nl-NL" smtClean="0"/>
-              <a:t>30-10-2024</a:t>
+              <a:t>15-1-2025</a:t>
             </a:fld>
             <a:endParaRPr lang="nl-NL"/>
           </a:p>
@@ -2700,7 +2701,7 @@
           <a:p>
             <a:fld id="{AED78EE6-7C35-42AA-BCAB-EACF262A9D8B}" type="datetimeFigureOut">
               <a:rPr lang="nl-NL" smtClean="0"/>
-              <a:t>30-10-2024</a:t>
+              <a:t>15-1-2025</a:t>
             </a:fld>
             <a:endParaRPr lang="nl-NL"/>
           </a:p>
@@ -2943,7 +2944,7 @@
           <a:p>
             <a:fld id="{AED78EE6-7C35-42AA-BCAB-EACF262A9D8B}" type="datetimeFigureOut">
               <a:rPr lang="nl-NL" smtClean="0"/>
-              <a:t>30-10-2024</a:t>
+              <a:t>15-1-2025</a:t>
             </a:fld>
             <a:endParaRPr lang="nl-NL"/>
           </a:p>
@@ -4072,6 +4073,177 @@
 </p:sld>
 </file>
 
+<file path=ppt/slides/slide4.xml><?xml version="1.0" encoding="utf-8"?>
+<p:sld xmlns:a="http://schemas.openxmlformats.org/drawingml/2006/main" xmlns:r="http://schemas.openxmlformats.org/officeDocument/2006/relationships" xmlns:p="http://schemas.openxmlformats.org/presentationml/2006/main">
+  <p:cSld>
+    <p:spTree>
+      <p:nvGrpSpPr>
+        <p:cNvPr id="1" name=""/>
+        <p:cNvGrpSpPr/>
+        <p:nvPr/>
+      </p:nvGrpSpPr>
+      <p:grpSpPr>
+        <a:xfrm>
+          <a:off x="0" y="0"/>
+          <a:ext cx="0" cy="0"/>
+          <a:chOff x="0" y="0"/>
+          <a:chExt cx="0" cy="0"/>
+        </a:xfrm>
+      </p:grpSpPr>
+      <p:sp>
+        <p:nvSpPr>
+          <p:cNvPr id="5" name="Rettangolo 4">
+            <a:extLst>
+              <a:ext uri="{FF2B5EF4-FFF2-40B4-BE49-F238E27FC236}">
+                <a16:creationId xmlns:a16="http://schemas.microsoft.com/office/drawing/2014/main" id="{5741C552-41D7-A8B1-02B4-6A6741FA6464}"/>
+              </a:ext>
+            </a:extLst>
+          </p:cNvPr>
+          <p:cNvSpPr/>
+          <p:nvPr/>
+        </p:nvSpPr>
+        <p:spPr>
+          <a:xfrm>
+            <a:off x="3265488" y="2654611"/>
+            <a:ext cx="5588000" cy="358151"/>
+          </a:xfrm>
+          <a:prstGeom prst="rect">
+            <a:avLst/>
+          </a:prstGeom>
+          <a:solidFill>
+            <a:srgbClr val="00B0F0"/>
+          </a:solidFill>
+          <a:ln>
+            <a:noFill/>
+          </a:ln>
+        </p:spPr>
+        <p:style>
+          <a:lnRef idx="2">
+            <a:schemeClr val="accent1">
+              <a:shade val="15000"/>
+            </a:schemeClr>
+          </a:lnRef>
+          <a:fillRef idx="1">
+            <a:schemeClr val="accent1"/>
+          </a:fillRef>
+          <a:effectRef idx="0">
+            <a:schemeClr val="accent1"/>
+          </a:effectRef>
+          <a:fontRef idx="minor">
+            <a:schemeClr val="lt1"/>
+          </a:fontRef>
+        </p:style>
+        <p:txBody>
+          <a:bodyPr rtlCol="0" anchor="ctr"/>
+          <a:lstStyle/>
+          <a:p>
+            <a:pPr algn="ctr"/>
+            <a:r>
+              <a:rPr lang="it-IT" sz="1400" b="1" dirty="0"/>
+              <a:t>M&amp;TT Colloquia: PhD </a:t>
+            </a:r>
+            <a:r>
+              <a:rPr lang="it-IT" sz="1400" b="1" dirty="0" err="1"/>
+              <a:t>presentations</a:t>
+            </a:r>
+            <a:endParaRPr lang="nl-NL" b="1" dirty="0"/>
+          </a:p>
+        </p:txBody>
+      </p:sp>
+      <p:pic>
+        <p:nvPicPr>
+          <p:cNvPr id="7" name="Immagine 6">
+            <a:extLst>
+              <a:ext uri="{FF2B5EF4-FFF2-40B4-BE49-F238E27FC236}">
+                <a16:creationId xmlns:a16="http://schemas.microsoft.com/office/drawing/2014/main" id="{66B83946-C27F-B19E-B763-1B474C36BCB1}"/>
+              </a:ext>
+            </a:extLst>
+          </p:cNvPr>
+          <p:cNvPicPr>
+            <a:picLocks noChangeAspect="1"/>
+          </p:cNvPicPr>
+          <p:nvPr/>
+        </p:nvPicPr>
+        <p:blipFill>
+          <a:blip r:embed="rId2"/>
+          <a:srcRect b="9620"/>
+          <a:stretch/>
+        </p:blipFill>
+        <p:spPr>
+          <a:xfrm>
+            <a:off x="3264230" y="3845237"/>
+            <a:ext cx="5590517" cy="358151"/>
+          </a:xfrm>
+          <a:prstGeom prst="rect">
+            <a:avLst/>
+          </a:prstGeom>
+        </p:spPr>
+      </p:pic>
+      <p:sp>
+        <p:nvSpPr>
+          <p:cNvPr id="8" name="Rettangolo 7">
+            <a:extLst>
+              <a:ext uri="{FF2B5EF4-FFF2-40B4-BE49-F238E27FC236}">
+                <a16:creationId xmlns:a16="http://schemas.microsoft.com/office/drawing/2014/main" id="{A789DE11-323D-739A-54DA-59C9E076D341}"/>
+              </a:ext>
+            </a:extLst>
+          </p:cNvPr>
+          <p:cNvSpPr/>
+          <p:nvPr/>
+        </p:nvSpPr>
+        <p:spPr>
+          <a:xfrm>
+            <a:off x="3265488" y="3384373"/>
+            <a:ext cx="5588000" cy="89254"/>
+          </a:xfrm>
+          <a:prstGeom prst="rect">
+            <a:avLst/>
+          </a:prstGeom>
+          <a:solidFill>
+            <a:srgbClr val="00B0F0"/>
+          </a:solidFill>
+          <a:ln>
+            <a:noFill/>
+          </a:ln>
+        </p:spPr>
+        <p:style>
+          <a:lnRef idx="2">
+            <a:schemeClr val="accent1">
+              <a:shade val="15000"/>
+            </a:schemeClr>
+          </a:lnRef>
+          <a:fillRef idx="1">
+            <a:schemeClr val="accent1"/>
+          </a:fillRef>
+          <a:effectRef idx="0">
+            <a:schemeClr val="accent1"/>
+          </a:effectRef>
+          <a:fontRef idx="minor">
+            <a:schemeClr val="lt1"/>
+          </a:fontRef>
+        </p:style>
+        <p:txBody>
+          <a:bodyPr rtlCol="0" anchor="ctr"/>
+          <a:lstStyle/>
+          <a:p>
+            <a:pPr algn="ctr"/>
+            <a:endParaRPr lang="nl-NL" b="1" dirty="0"/>
+          </a:p>
+        </p:txBody>
+      </p:sp>
+    </p:spTree>
+    <p:extLst>
+      <p:ext uri="{BB962C8B-B14F-4D97-AF65-F5344CB8AC3E}">
+        <p14:creationId xmlns:p14="http://schemas.microsoft.com/office/powerpoint/2010/main" val="715505317"/>
+      </p:ext>
+    </p:extLst>
+  </p:cSld>
+  <p:clrMapOvr>
+    <a:masterClrMapping/>
+  </p:clrMapOvr>
+</p:sld>
+</file>
+
 <file path=ppt/theme/theme1.xml><?xml version="1.0" encoding="utf-8"?>
 <a:theme xmlns:a="http://schemas.openxmlformats.org/drawingml/2006/main" name="Tema di Office">
   <a:themeElements>

</xml_diff>

<commit_message>
22-10-2025 - Weekly Update
</commit_message>
<xml_diff>
--- a/Website pic standardization.pptx
+++ b/Website pic standardization.pptx
@@ -126,6 +126,75 @@
 </p:presentation>
 </file>
 
+<file path=ppt/revisionInfo.xml><?xml version="1.0" encoding="utf-8"?>
+<p1510:revInfo xmlns:a="http://schemas.openxmlformats.org/drawingml/2006/main" xmlns:r="http://schemas.openxmlformats.org/officeDocument/2006/relationships" xmlns:p1510="http://schemas.microsoft.com/office/powerpoint/2015/10/main">
+  <p1510:revLst>
+    <p1510:client id="{9278A0FF-D72E-4407-92FA-D4B6D2094C6C}" v="10" dt="2025-10-22T12:52:30.669"/>
+  </p1510:revLst>
+</p1510:revInfo>
+</file>
+
+<file path=ppt/changesInfos/changesInfo1.xml><?xml version="1.0" encoding="utf-8"?>
+<pc:chgInfo xmlns:a="http://schemas.openxmlformats.org/drawingml/2006/main" xmlns:r="http://schemas.openxmlformats.org/officeDocument/2006/relationships" xmlns:ac="http://schemas.microsoft.com/office/drawing/2013/main/command" xmlns:pc="http://schemas.microsoft.com/office/powerpoint/2013/main/command">
+  <pc:docChgLst>
+    <pc:chgData name="Andrea Caspani" userId="7345b5ed-8b71-432a-9bb0-dc2ce0ac91b1" providerId="ADAL" clId="{B76F09E3-2273-4519-9469-188BBF2C42C4}"/>
+    <pc:docChg chg="modSld">
+      <pc:chgData name="Andrea Caspani" userId="7345b5ed-8b71-432a-9bb0-dc2ce0ac91b1" providerId="ADAL" clId="{B76F09E3-2273-4519-9469-188BBF2C42C4}" dt="2025-10-22T13:04:24.593" v="25" actId="207"/>
+      <pc:docMkLst>
+        <pc:docMk/>
+      </pc:docMkLst>
+      <pc:sldChg chg="addSp delSp modSp mod">
+        <pc:chgData name="Andrea Caspani" userId="7345b5ed-8b71-432a-9bb0-dc2ce0ac91b1" providerId="ADAL" clId="{B76F09E3-2273-4519-9469-188BBF2C42C4}" dt="2025-10-22T13:04:24.593" v="25" actId="207"/>
+        <pc:sldMkLst>
+          <pc:docMk/>
+          <pc:sldMk cId="3775944948" sldId="258"/>
+        </pc:sldMkLst>
+        <pc:spChg chg="mod">
+          <ac:chgData name="Andrea Caspani" userId="7345b5ed-8b71-432a-9bb0-dc2ce0ac91b1" providerId="ADAL" clId="{B76F09E3-2273-4519-9469-188BBF2C42C4}" dt="2025-10-22T13:04:24.593" v="25" actId="207"/>
+          <ac:spMkLst>
+            <pc:docMk/>
+            <pc:sldMk cId="3775944948" sldId="258"/>
+            <ac:spMk id="4" creationId="{A4B43D83-03A1-8289-E760-4AF948E0C4F9}"/>
+          </ac:spMkLst>
+        </pc:spChg>
+        <pc:grpChg chg="add del mod">
+          <ac:chgData name="Andrea Caspani" userId="7345b5ed-8b71-432a-9bb0-dc2ce0ac91b1" providerId="ADAL" clId="{B76F09E3-2273-4519-9469-188BBF2C42C4}" dt="2025-10-22T13:03:22.596" v="11" actId="478"/>
+          <ac:grpSpMkLst>
+            <pc:docMk/>
+            <pc:sldMk cId="3775944948" sldId="258"/>
+            <ac:grpSpMk id="2" creationId="{EAF09DBE-D4CF-DBE4-468B-88563AB6324B}"/>
+          </ac:grpSpMkLst>
+        </pc:grpChg>
+        <pc:grpChg chg="add del mod">
+          <ac:chgData name="Andrea Caspani" userId="7345b5ed-8b71-432a-9bb0-dc2ce0ac91b1" providerId="ADAL" clId="{B76F09E3-2273-4519-9469-188BBF2C42C4}" dt="2025-10-22T13:04:20.235" v="24" actId="478"/>
+          <ac:grpSpMkLst>
+            <pc:docMk/>
+            <pc:sldMk cId="3775944948" sldId="258"/>
+            <ac:grpSpMk id="5" creationId="{3A3C0964-93F5-B520-569D-A4FD771FE3F9}"/>
+          </ac:grpSpMkLst>
+        </pc:grpChg>
+        <pc:picChg chg="add del mod">
+          <ac:chgData name="Andrea Caspani" userId="7345b5ed-8b71-432a-9bb0-dc2ce0ac91b1" providerId="ADAL" clId="{B76F09E3-2273-4519-9469-188BBF2C42C4}" dt="2025-10-22T13:04:20.235" v="24" actId="478"/>
+          <ac:picMkLst>
+            <pc:docMk/>
+            <pc:sldMk cId="3775944948" sldId="258"/>
+            <ac:picMk id="3" creationId="{97A5D96C-6391-4549-3103-3856F2BCB304}"/>
+          </ac:picMkLst>
+        </pc:picChg>
+        <pc:picChg chg="add del mod">
+          <ac:chgData name="Andrea Caspani" userId="7345b5ed-8b71-432a-9bb0-dc2ce0ac91b1" providerId="ADAL" clId="{B76F09E3-2273-4519-9469-188BBF2C42C4}" dt="2025-10-22T13:03:22.596" v="11" actId="478"/>
+          <ac:picMkLst>
+            <pc:docMk/>
+            <pc:sldMk cId="3775944948" sldId="258"/>
+            <ac:picMk id="1026" creationId="{D7D890C5-174C-6DDC-9452-A4AEA42C906C}"/>
+          </ac:picMkLst>
+        </pc:picChg>
+      </pc:sldChg>
+    </pc:docChg>
+  </pc:docChgLst>
+</pc:chgInfo>
+</file>
+
 <file path=ppt/slideLayouts/slideLayout1.xml><?xml version="1.0" encoding="utf-8"?>
 <p:sldLayout xmlns:a="http://schemas.openxmlformats.org/drawingml/2006/main" xmlns:r="http://schemas.openxmlformats.org/officeDocument/2006/relationships" xmlns:p="http://schemas.openxmlformats.org/presentationml/2006/main" type="title" preserve="1">
   <p:cSld name="Diapositiva titolo">
@@ -275,7 +344,7 @@
           <a:p>
             <a:fld id="{AED78EE6-7C35-42AA-BCAB-EACF262A9D8B}" type="datetimeFigureOut">
               <a:rPr lang="nl-NL" smtClean="0"/>
-              <a:t>15-1-2025</a:t>
+              <a:t>22-10-2025</a:t>
             </a:fld>
             <a:endParaRPr lang="nl-NL"/>
           </a:p>
@@ -329,7 +398,7 @@
           <a:p>
             <a:fld id="{6A95FB9C-9C97-4FB8-AC15-444BF01B5A50}" type="slidenum">
               <a:rPr lang="nl-NL" smtClean="0"/>
-              <a:t>‹N›</a:t>
+              <a:t>‹#›</a:t>
             </a:fld>
             <a:endParaRPr lang="nl-NL"/>
           </a:p>
@@ -475,7 +544,7 @@
           <a:p>
             <a:fld id="{AED78EE6-7C35-42AA-BCAB-EACF262A9D8B}" type="datetimeFigureOut">
               <a:rPr lang="nl-NL" smtClean="0"/>
-              <a:t>15-1-2025</a:t>
+              <a:t>22-10-2025</a:t>
             </a:fld>
             <a:endParaRPr lang="nl-NL"/>
           </a:p>
@@ -529,7 +598,7 @@
           <a:p>
             <a:fld id="{6A95FB9C-9C97-4FB8-AC15-444BF01B5A50}" type="slidenum">
               <a:rPr lang="nl-NL" smtClean="0"/>
-              <a:t>‹N›</a:t>
+              <a:t>‹#›</a:t>
             </a:fld>
             <a:endParaRPr lang="nl-NL"/>
           </a:p>
@@ -685,7 +754,7 @@
           <a:p>
             <a:fld id="{AED78EE6-7C35-42AA-BCAB-EACF262A9D8B}" type="datetimeFigureOut">
               <a:rPr lang="nl-NL" smtClean="0"/>
-              <a:t>15-1-2025</a:t>
+              <a:t>22-10-2025</a:t>
             </a:fld>
             <a:endParaRPr lang="nl-NL"/>
           </a:p>
@@ -739,7 +808,7 @@
           <a:p>
             <a:fld id="{6A95FB9C-9C97-4FB8-AC15-444BF01B5A50}" type="slidenum">
               <a:rPr lang="nl-NL" smtClean="0"/>
-              <a:t>‹N›</a:t>
+              <a:t>‹#›</a:t>
             </a:fld>
             <a:endParaRPr lang="nl-NL"/>
           </a:p>
@@ -885,7 +954,7 @@
           <a:p>
             <a:fld id="{AED78EE6-7C35-42AA-BCAB-EACF262A9D8B}" type="datetimeFigureOut">
               <a:rPr lang="nl-NL" smtClean="0"/>
-              <a:t>15-1-2025</a:t>
+              <a:t>22-10-2025</a:t>
             </a:fld>
             <a:endParaRPr lang="nl-NL"/>
           </a:p>
@@ -939,7 +1008,7 @@
           <a:p>
             <a:fld id="{6A95FB9C-9C97-4FB8-AC15-444BF01B5A50}" type="slidenum">
               <a:rPr lang="nl-NL" smtClean="0"/>
-              <a:t>‹N›</a:t>
+              <a:t>‹#›</a:t>
             </a:fld>
             <a:endParaRPr lang="nl-NL"/>
           </a:p>
@@ -1161,7 +1230,7 @@
           <a:p>
             <a:fld id="{AED78EE6-7C35-42AA-BCAB-EACF262A9D8B}" type="datetimeFigureOut">
               <a:rPr lang="nl-NL" smtClean="0"/>
-              <a:t>15-1-2025</a:t>
+              <a:t>22-10-2025</a:t>
             </a:fld>
             <a:endParaRPr lang="nl-NL"/>
           </a:p>
@@ -1215,7 +1284,7 @@
           <a:p>
             <a:fld id="{6A95FB9C-9C97-4FB8-AC15-444BF01B5A50}" type="slidenum">
               <a:rPr lang="nl-NL" smtClean="0"/>
-              <a:t>‹N›</a:t>
+              <a:t>‹#›</a:t>
             </a:fld>
             <a:endParaRPr lang="nl-NL"/>
           </a:p>
@@ -1429,7 +1498,7 @@
           <a:p>
             <a:fld id="{AED78EE6-7C35-42AA-BCAB-EACF262A9D8B}" type="datetimeFigureOut">
               <a:rPr lang="nl-NL" smtClean="0"/>
-              <a:t>15-1-2025</a:t>
+              <a:t>22-10-2025</a:t>
             </a:fld>
             <a:endParaRPr lang="nl-NL"/>
           </a:p>
@@ -1483,7 +1552,7 @@
           <a:p>
             <a:fld id="{6A95FB9C-9C97-4FB8-AC15-444BF01B5A50}" type="slidenum">
               <a:rPr lang="nl-NL" smtClean="0"/>
-              <a:t>‹N›</a:t>
+              <a:t>‹#›</a:t>
             </a:fld>
             <a:endParaRPr lang="nl-NL"/>
           </a:p>
@@ -1844,7 +1913,7 @@
           <a:p>
             <a:fld id="{AED78EE6-7C35-42AA-BCAB-EACF262A9D8B}" type="datetimeFigureOut">
               <a:rPr lang="nl-NL" smtClean="0"/>
-              <a:t>15-1-2025</a:t>
+              <a:t>22-10-2025</a:t>
             </a:fld>
             <a:endParaRPr lang="nl-NL"/>
           </a:p>
@@ -1898,7 +1967,7 @@
           <a:p>
             <a:fld id="{6A95FB9C-9C97-4FB8-AC15-444BF01B5A50}" type="slidenum">
               <a:rPr lang="nl-NL" smtClean="0"/>
-              <a:t>‹N›</a:t>
+              <a:t>‹#›</a:t>
             </a:fld>
             <a:endParaRPr lang="nl-NL"/>
           </a:p>
@@ -1986,7 +2055,7 @@
           <a:p>
             <a:fld id="{AED78EE6-7C35-42AA-BCAB-EACF262A9D8B}" type="datetimeFigureOut">
               <a:rPr lang="nl-NL" smtClean="0"/>
-              <a:t>15-1-2025</a:t>
+              <a:t>22-10-2025</a:t>
             </a:fld>
             <a:endParaRPr lang="nl-NL"/>
           </a:p>
@@ -2040,7 +2109,7 @@
           <a:p>
             <a:fld id="{6A95FB9C-9C97-4FB8-AC15-444BF01B5A50}" type="slidenum">
               <a:rPr lang="nl-NL" smtClean="0"/>
-              <a:t>‹N›</a:t>
+              <a:t>‹#›</a:t>
             </a:fld>
             <a:endParaRPr lang="nl-NL"/>
           </a:p>
@@ -2099,7 +2168,7 @@
           <a:p>
             <a:fld id="{AED78EE6-7C35-42AA-BCAB-EACF262A9D8B}" type="datetimeFigureOut">
               <a:rPr lang="nl-NL" smtClean="0"/>
-              <a:t>15-1-2025</a:t>
+              <a:t>22-10-2025</a:t>
             </a:fld>
             <a:endParaRPr lang="nl-NL"/>
           </a:p>
@@ -2153,7 +2222,7 @@
           <a:p>
             <a:fld id="{6A95FB9C-9C97-4FB8-AC15-444BF01B5A50}" type="slidenum">
               <a:rPr lang="nl-NL" smtClean="0"/>
-              <a:t>‹N›</a:t>
+              <a:t>‹#›</a:t>
             </a:fld>
             <a:endParaRPr lang="nl-NL"/>
           </a:p>
@@ -2412,7 +2481,7 @@
           <a:p>
             <a:fld id="{AED78EE6-7C35-42AA-BCAB-EACF262A9D8B}" type="datetimeFigureOut">
               <a:rPr lang="nl-NL" smtClean="0"/>
-              <a:t>15-1-2025</a:t>
+              <a:t>22-10-2025</a:t>
             </a:fld>
             <a:endParaRPr lang="nl-NL"/>
           </a:p>
@@ -2466,7 +2535,7 @@
           <a:p>
             <a:fld id="{6A95FB9C-9C97-4FB8-AC15-444BF01B5A50}" type="slidenum">
               <a:rPr lang="nl-NL" smtClean="0"/>
-              <a:t>‹N›</a:t>
+              <a:t>‹#›</a:t>
             </a:fld>
             <a:endParaRPr lang="nl-NL"/>
           </a:p>
@@ -2701,7 +2770,7 @@
           <a:p>
             <a:fld id="{AED78EE6-7C35-42AA-BCAB-EACF262A9D8B}" type="datetimeFigureOut">
               <a:rPr lang="nl-NL" smtClean="0"/>
-              <a:t>15-1-2025</a:t>
+              <a:t>22-10-2025</a:t>
             </a:fld>
             <a:endParaRPr lang="nl-NL"/>
           </a:p>
@@ -2755,7 +2824,7 @@
           <a:p>
             <a:fld id="{6A95FB9C-9C97-4FB8-AC15-444BF01B5A50}" type="slidenum">
               <a:rPr lang="nl-NL" smtClean="0"/>
-              <a:t>‹N›</a:t>
+              <a:t>‹#›</a:t>
             </a:fld>
             <a:endParaRPr lang="nl-NL"/>
           </a:p>
@@ -2944,7 +3013,7 @@
           <a:p>
             <a:fld id="{AED78EE6-7C35-42AA-BCAB-EACF262A9D8B}" type="datetimeFigureOut">
               <a:rPr lang="nl-NL" smtClean="0"/>
-              <a:t>15-1-2025</a:t>
+              <a:t>22-10-2025</a:t>
             </a:fld>
             <a:endParaRPr lang="nl-NL"/>
           </a:p>
@@ -3034,7 +3103,7 @@
           <a:p>
             <a:fld id="{6A95FB9C-9C97-4FB8-AC15-444BF01B5A50}" type="slidenum">
               <a:rPr lang="nl-NL" smtClean="0"/>
-              <a:t>‹N›</a:t>
+              <a:t>‹#›</a:t>
             </a:fld>
             <a:endParaRPr lang="nl-NL"/>
           </a:p>
@@ -4029,7 +4098,7 @@
             <a:avLst/>
           </a:prstGeom>
           <a:solidFill>
-            <a:srgbClr val="00A5D5"/>
+            <a:srgbClr val="00B0F0"/>
           </a:solidFill>
           <a:ln>
             <a:noFill/>

</xml_diff>

<commit_message>
04-02-2026 - Weekly update before colloquium
</commit_message>
<xml_diff>
--- a/Website pic standardization.pptx
+++ b/Website pic standardization.pptx
@@ -129,7 +129,7 @@
 <file path=ppt/revisionInfo.xml><?xml version="1.0" encoding="utf-8"?>
 <p1510:revInfo xmlns:a="http://schemas.openxmlformats.org/drawingml/2006/main" xmlns:r="http://schemas.openxmlformats.org/officeDocument/2006/relationships" xmlns:p1510="http://schemas.microsoft.com/office/powerpoint/2015/10/main">
   <p1510:revLst>
-    <p1510:client id="{9278A0FF-D72E-4407-92FA-D4B6D2094C6C}" v="10" dt="2025-10-22T12:52:30.669"/>
+    <p1510:client id="{C5CA0109-A9E6-4582-9323-2954A8A14E8B}" v="4" dt="2026-02-04T12:41:47.157"/>
   </p1510:revLst>
 </p1510:revInfo>
 </file>
@@ -138,55 +138,39 @@
 <pc:chgInfo xmlns:a="http://schemas.openxmlformats.org/drawingml/2006/main" xmlns:r="http://schemas.openxmlformats.org/officeDocument/2006/relationships" xmlns:ac="http://schemas.microsoft.com/office/drawing/2013/main/command" xmlns:pc="http://schemas.microsoft.com/office/powerpoint/2013/main/command">
   <pc:docChgLst>
     <pc:chgData name="Andrea Caspani" userId="7345b5ed-8b71-432a-9bb0-dc2ce0ac91b1" providerId="ADAL" clId="{B76F09E3-2273-4519-9469-188BBF2C42C4}"/>
-    <pc:docChg chg="modSld">
-      <pc:chgData name="Andrea Caspani" userId="7345b5ed-8b71-432a-9bb0-dc2ce0ac91b1" providerId="ADAL" clId="{B76F09E3-2273-4519-9469-188BBF2C42C4}" dt="2025-10-22T13:04:24.593" v="25" actId="207"/>
+    <pc:docChg chg="undo custSel modSld">
+      <pc:chgData name="Andrea Caspani" userId="7345b5ed-8b71-432a-9bb0-dc2ce0ac91b1" providerId="ADAL" clId="{B76F09E3-2273-4519-9469-188BBF2C42C4}" dt="2026-02-04T12:41:46.723" v="42" actId="14100"/>
       <pc:docMkLst>
         <pc:docMk/>
       </pc:docMkLst>
       <pc:sldChg chg="addSp delSp modSp mod">
-        <pc:chgData name="Andrea Caspani" userId="7345b5ed-8b71-432a-9bb0-dc2ce0ac91b1" providerId="ADAL" clId="{B76F09E3-2273-4519-9469-188BBF2C42C4}" dt="2025-10-22T13:04:24.593" v="25" actId="207"/>
+        <pc:chgData name="Andrea Caspani" userId="7345b5ed-8b71-432a-9bb0-dc2ce0ac91b1" providerId="ADAL" clId="{B76F09E3-2273-4519-9469-188BBF2C42C4}" dt="2026-02-04T12:41:46.723" v="42" actId="14100"/>
         <pc:sldMkLst>
           <pc:docMk/>
           <pc:sldMk cId="3775944948" sldId="258"/>
         </pc:sldMkLst>
         <pc:spChg chg="mod">
-          <ac:chgData name="Andrea Caspani" userId="7345b5ed-8b71-432a-9bb0-dc2ce0ac91b1" providerId="ADAL" clId="{B76F09E3-2273-4519-9469-188BBF2C42C4}" dt="2025-10-22T13:04:24.593" v="25" actId="207"/>
+          <ac:chgData name="Andrea Caspani" userId="7345b5ed-8b71-432a-9bb0-dc2ce0ac91b1" providerId="ADAL" clId="{B76F09E3-2273-4519-9469-188BBF2C42C4}" dt="2026-02-04T12:41:45.704" v="38" actId="207"/>
           <ac:spMkLst>
             <pc:docMk/>
             <pc:sldMk cId="3775944948" sldId="258"/>
             <ac:spMk id="4" creationId="{A4B43D83-03A1-8289-E760-4AF948E0C4F9}"/>
           </ac:spMkLst>
         </pc:spChg>
-        <pc:grpChg chg="add del mod">
-          <ac:chgData name="Andrea Caspani" userId="7345b5ed-8b71-432a-9bb0-dc2ce0ac91b1" providerId="ADAL" clId="{B76F09E3-2273-4519-9469-188BBF2C42C4}" dt="2025-10-22T13:03:22.596" v="11" actId="478"/>
+        <pc:grpChg chg="add mod">
+          <ac:chgData name="Andrea Caspani" userId="7345b5ed-8b71-432a-9bb0-dc2ce0ac91b1" providerId="ADAL" clId="{B76F09E3-2273-4519-9469-188BBF2C42C4}" dt="2026-02-04T12:41:45.371" v="36" actId="164"/>
           <ac:grpSpMkLst>
             <pc:docMk/>
             <pc:sldMk cId="3775944948" sldId="258"/>
-            <ac:grpSpMk id="2" creationId="{EAF09DBE-D4CF-DBE4-468B-88563AB6324B}"/>
+            <ac:grpSpMk id="5" creationId="{6810F48D-28AF-B23B-D084-4104ABFA5835}"/>
           </ac:grpSpMkLst>
         </pc:grpChg>
-        <pc:grpChg chg="add del mod">
-          <ac:chgData name="Andrea Caspani" userId="7345b5ed-8b71-432a-9bb0-dc2ce0ac91b1" providerId="ADAL" clId="{B76F09E3-2273-4519-9469-188BBF2C42C4}" dt="2025-10-22T13:04:20.235" v="24" actId="478"/>
-          <ac:grpSpMkLst>
-            <pc:docMk/>
-            <pc:sldMk cId="3775944948" sldId="258"/>
-            <ac:grpSpMk id="5" creationId="{3A3C0964-93F5-B520-569D-A4FD771FE3F9}"/>
-          </ac:grpSpMkLst>
-        </pc:grpChg>
-        <pc:picChg chg="add del mod">
-          <ac:chgData name="Andrea Caspani" userId="7345b5ed-8b71-432a-9bb0-dc2ce0ac91b1" providerId="ADAL" clId="{B76F09E3-2273-4519-9469-188BBF2C42C4}" dt="2025-10-22T13:04:20.235" v="24" actId="478"/>
+        <pc:picChg chg="add mod">
+          <ac:chgData name="Andrea Caspani" userId="7345b5ed-8b71-432a-9bb0-dc2ce0ac91b1" providerId="ADAL" clId="{B76F09E3-2273-4519-9469-188BBF2C42C4}" dt="2026-02-04T12:41:46.723" v="42" actId="14100"/>
           <ac:picMkLst>
             <pc:docMk/>
             <pc:sldMk cId="3775944948" sldId="258"/>
-            <ac:picMk id="3" creationId="{97A5D96C-6391-4549-3103-3856F2BCB304}"/>
-          </ac:picMkLst>
-        </pc:picChg>
-        <pc:picChg chg="add del mod">
-          <ac:chgData name="Andrea Caspani" userId="7345b5ed-8b71-432a-9bb0-dc2ce0ac91b1" providerId="ADAL" clId="{B76F09E3-2273-4519-9469-188BBF2C42C4}" dt="2025-10-22T13:03:22.596" v="11" actId="478"/>
-          <ac:picMkLst>
-            <pc:docMk/>
-            <pc:sldMk cId="3775944948" sldId="258"/>
-            <ac:picMk id="1026" creationId="{D7D890C5-174C-6DDC-9452-A4AEA42C906C}"/>
+            <ac:picMk id="3" creationId="{387C6EB6-5920-81A3-B390-8C0DB6BECDFA}"/>
           </ac:picMkLst>
         </pc:picChg>
       </pc:sldChg>
@@ -344,7 +328,7 @@
           <a:p>
             <a:fld id="{AED78EE6-7C35-42AA-BCAB-EACF262A9D8B}" type="datetimeFigureOut">
               <a:rPr lang="nl-NL" smtClean="0"/>
-              <a:t>22-10-2025</a:t>
+              <a:t>4-2-2026</a:t>
             </a:fld>
             <a:endParaRPr lang="nl-NL"/>
           </a:p>
@@ -398,7 +382,7 @@
           <a:p>
             <a:fld id="{6A95FB9C-9C97-4FB8-AC15-444BF01B5A50}" type="slidenum">
               <a:rPr lang="nl-NL" smtClean="0"/>
-              <a:t>‹#›</a:t>
+              <a:t>‹N›</a:t>
             </a:fld>
             <a:endParaRPr lang="nl-NL"/>
           </a:p>
@@ -544,7 +528,7 @@
           <a:p>
             <a:fld id="{AED78EE6-7C35-42AA-BCAB-EACF262A9D8B}" type="datetimeFigureOut">
               <a:rPr lang="nl-NL" smtClean="0"/>
-              <a:t>22-10-2025</a:t>
+              <a:t>4-2-2026</a:t>
             </a:fld>
             <a:endParaRPr lang="nl-NL"/>
           </a:p>
@@ -598,7 +582,7 @@
           <a:p>
             <a:fld id="{6A95FB9C-9C97-4FB8-AC15-444BF01B5A50}" type="slidenum">
               <a:rPr lang="nl-NL" smtClean="0"/>
-              <a:t>‹#›</a:t>
+              <a:t>‹N›</a:t>
             </a:fld>
             <a:endParaRPr lang="nl-NL"/>
           </a:p>
@@ -754,7 +738,7 @@
           <a:p>
             <a:fld id="{AED78EE6-7C35-42AA-BCAB-EACF262A9D8B}" type="datetimeFigureOut">
               <a:rPr lang="nl-NL" smtClean="0"/>
-              <a:t>22-10-2025</a:t>
+              <a:t>4-2-2026</a:t>
             </a:fld>
             <a:endParaRPr lang="nl-NL"/>
           </a:p>
@@ -808,7 +792,7 @@
           <a:p>
             <a:fld id="{6A95FB9C-9C97-4FB8-AC15-444BF01B5A50}" type="slidenum">
               <a:rPr lang="nl-NL" smtClean="0"/>
-              <a:t>‹#›</a:t>
+              <a:t>‹N›</a:t>
             </a:fld>
             <a:endParaRPr lang="nl-NL"/>
           </a:p>
@@ -954,7 +938,7 @@
           <a:p>
             <a:fld id="{AED78EE6-7C35-42AA-BCAB-EACF262A9D8B}" type="datetimeFigureOut">
               <a:rPr lang="nl-NL" smtClean="0"/>
-              <a:t>22-10-2025</a:t>
+              <a:t>4-2-2026</a:t>
             </a:fld>
             <a:endParaRPr lang="nl-NL"/>
           </a:p>
@@ -1008,7 +992,7 @@
           <a:p>
             <a:fld id="{6A95FB9C-9C97-4FB8-AC15-444BF01B5A50}" type="slidenum">
               <a:rPr lang="nl-NL" smtClean="0"/>
-              <a:t>‹#›</a:t>
+              <a:t>‹N›</a:t>
             </a:fld>
             <a:endParaRPr lang="nl-NL"/>
           </a:p>
@@ -1230,7 +1214,7 @@
           <a:p>
             <a:fld id="{AED78EE6-7C35-42AA-BCAB-EACF262A9D8B}" type="datetimeFigureOut">
               <a:rPr lang="nl-NL" smtClean="0"/>
-              <a:t>22-10-2025</a:t>
+              <a:t>4-2-2026</a:t>
             </a:fld>
             <a:endParaRPr lang="nl-NL"/>
           </a:p>
@@ -1284,7 +1268,7 @@
           <a:p>
             <a:fld id="{6A95FB9C-9C97-4FB8-AC15-444BF01B5A50}" type="slidenum">
               <a:rPr lang="nl-NL" smtClean="0"/>
-              <a:t>‹#›</a:t>
+              <a:t>‹N›</a:t>
             </a:fld>
             <a:endParaRPr lang="nl-NL"/>
           </a:p>
@@ -1498,7 +1482,7 @@
           <a:p>
             <a:fld id="{AED78EE6-7C35-42AA-BCAB-EACF262A9D8B}" type="datetimeFigureOut">
               <a:rPr lang="nl-NL" smtClean="0"/>
-              <a:t>22-10-2025</a:t>
+              <a:t>4-2-2026</a:t>
             </a:fld>
             <a:endParaRPr lang="nl-NL"/>
           </a:p>
@@ -1552,7 +1536,7 @@
           <a:p>
             <a:fld id="{6A95FB9C-9C97-4FB8-AC15-444BF01B5A50}" type="slidenum">
               <a:rPr lang="nl-NL" smtClean="0"/>
-              <a:t>‹#›</a:t>
+              <a:t>‹N›</a:t>
             </a:fld>
             <a:endParaRPr lang="nl-NL"/>
           </a:p>
@@ -1913,7 +1897,7 @@
           <a:p>
             <a:fld id="{AED78EE6-7C35-42AA-BCAB-EACF262A9D8B}" type="datetimeFigureOut">
               <a:rPr lang="nl-NL" smtClean="0"/>
-              <a:t>22-10-2025</a:t>
+              <a:t>4-2-2026</a:t>
             </a:fld>
             <a:endParaRPr lang="nl-NL"/>
           </a:p>
@@ -1967,7 +1951,7 @@
           <a:p>
             <a:fld id="{6A95FB9C-9C97-4FB8-AC15-444BF01B5A50}" type="slidenum">
               <a:rPr lang="nl-NL" smtClean="0"/>
-              <a:t>‹#›</a:t>
+              <a:t>‹N›</a:t>
             </a:fld>
             <a:endParaRPr lang="nl-NL"/>
           </a:p>
@@ -2055,7 +2039,7 @@
           <a:p>
             <a:fld id="{AED78EE6-7C35-42AA-BCAB-EACF262A9D8B}" type="datetimeFigureOut">
               <a:rPr lang="nl-NL" smtClean="0"/>
-              <a:t>22-10-2025</a:t>
+              <a:t>4-2-2026</a:t>
             </a:fld>
             <a:endParaRPr lang="nl-NL"/>
           </a:p>
@@ -2109,7 +2093,7 @@
           <a:p>
             <a:fld id="{6A95FB9C-9C97-4FB8-AC15-444BF01B5A50}" type="slidenum">
               <a:rPr lang="nl-NL" smtClean="0"/>
-              <a:t>‹#›</a:t>
+              <a:t>‹N›</a:t>
             </a:fld>
             <a:endParaRPr lang="nl-NL"/>
           </a:p>
@@ -2168,7 +2152,7 @@
           <a:p>
             <a:fld id="{AED78EE6-7C35-42AA-BCAB-EACF262A9D8B}" type="datetimeFigureOut">
               <a:rPr lang="nl-NL" smtClean="0"/>
-              <a:t>22-10-2025</a:t>
+              <a:t>4-2-2026</a:t>
             </a:fld>
             <a:endParaRPr lang="nl-NL"/>
           </a:p>
@@ -2222,7 +2206,7 @@
           <a:p>
             <a:fld id="{6A95FB9C-9C97-4FB8-AC15-444BF01B5A50}" type="slidenum">
               <a:rPr lang="nl-NL" smtClean="0"/>
-              <a:t>‹#›</a:t>
+              <a:t>‹N›</a:t>
             </a:fld>
             <a:endParaRPr lang="nl-NL"/>
           </a:p>
@@ -2481,7 +2465,7 @@
           <a:p>
             <a:fld id="{AED78EE6-7C35-42AA-BCAB-EACF262A9D8B}" type="datetimeFigureOut">
               <a:rPr lang="nl-NL" smtClean="0"/>
-              <a:t>22-10-2025</a:t>
+              <a:t>4-2-2026</a:t>
             </a:fld>
             <a:endParaRPr lang="nl-NL"/>
           </a:p>
@@ -2535,7 +2519,7 @@
           <a:p>
             <a:fld id="{6A95FB9C-9C97-4FB8-AC15-444BF01B5A50}" type="slidenum">
               <a:rPr lang="nl-NL" smtClean="0"/>
-              <a:t>‹#›</a:t>
+              <a:t>‹N›</a:t>
             </a:fld>
             <a:endParaRPr lang="nl-NL"/>
           </a:p>
@@ -2770,7 +2754,7 @@
           <a:p>
             <a:fld id="{AED78EE6-7C35-42AA-BCAB-EACF262A9D8B}" type="datetimeFigureOut">
               <a:rPr lang="nl-NL" smtClean="0"/>
-              <a:t>22-10-2025</a:t>
+              <a:t>4-2-2026</a:t>
             </a:fld>
             <a:endParaRPr lang="nl-NL"/>
           </a:p>
@@ -2824,7 +2808,7 @@
           <a:p>
             <a:fld id="{6A95FB9C-9C97-4FB8-AC15-444BF01B5A50}" type="slidenum">
               <a:rPr lang="nl-NL" smtClean="0"/>
-              <a:t>‹#›</a:t>
+              <a:t>‹N›</a:t>
             </a:fld>
             <a:endParaRPr lang="nl-NL"/>
           </a:p>
@@ -3013,7 +2997,7 @@
           <a:p>
             <a:fld id="{AED78EE6-7C35-42AA-BCAB-EACF262A9D8B}" type="datetimeFigureOut">
               <a:rPr lang="nl-NL" smtClean="0"/>
-              <a:t>22-10-2025</a:t>
+              <a:t>4-2-2026</a:t>
             </a:fld>
             <a:endParaRPr lang="nl-NL"/>
           </a:p>
@@ -3103,7 +3087,7 @@
           <a:p>
             <a:fld id="{6A95FB9C-9C97-4FB8-AC15-444BF01B5A50}" type="slidenum">
               <a:rPr lang="nl-NL" smtClean="0"/>
-              <a:t>‹#›</a:t>
+              <a:t>‹N›</a:t>
             </a:fld>
             <a:endParaRPr lang="nl-NL"/>
           </a:p>

</xml_diff>